<commit_message>
2nd commit with git1.ppx at 3:10PM
</commit_message>
<xml_diff>
--- a/Git1.pptx
+++ b/Git1.pptx
@@ -48076,6 +48076,33 @@
               <a:rPr lang="en-US" dirty="0"/>
               <a:t>git commit -m "First release of Hello World!“  // here msg we need to add them</a:t>
             </a:r>
+          </a:p>
+          <a:p>
+            <a:endParaRPr lang="en-US" dirty="0"/>
+          </a:p>
+          <a:p>
+            <a:r>
+              <a:rPr lang="en-US" dirty="0"/>
+              <a:t>To Remove file from the git stage </a:t>
+            </a:r>
+          </a:p>
+          <a:p>
+            <a:r>
+              <a:rPr lang="en-US" dirty="0"/>
+              <a:t>Git </a:t>
+            </a:r>
+            <a:r>
+              <a:rPr lang="en-US"/>
+              <a:t>rm  - </a:t>
+            </a:r>
+            <a:r>
+              <a:rPr lang="en-US" dirty="0"/>
+              <a:t>-</a:t>
+            </a:r>
+            <a:r>
+              <a:rPr lang="en-US"/>
+              <a:t>cached filename</a:t>
+            </a:r>
             <a:endParaRPr lang="en-IN" dirty="0"/>
           </a:p>
         </p:txBody>

</xml_diff>

<commit_message>
commit git1.pptx at 3:50pm
</commit_message>
<xml_diff>
--- a/Git1.pptx
+++ b/Git1.pptx
@@ -48089,19 +48089,22 @@
           <a:p>
             <a:r>
               <a:rPr lang="en-US" dirty="0"/>
-              <a:t>Git </a:t>
+              <a:t>Git rm  - -cached filename</a:t>
             </a:r>
+          </a:p>
+          <a:p>
+            <a:endParaRPr lang="en-US" dirty="0"/>
+          </a:p>
+          <a:p>
+            <a:r>
+              <a:rPr lang="en-US" dirty="0"/>
+              <a:t>To show git log </a:t>
+            </a:r>
+          </a:p>
+          <a:p>
             <a:r>
               <a:rPr lang="en-US"/>
-              <a:t>rm  - </a:t>
-            </a:r>
-            <a:r>
-              <a:rPr lang="en-US" dirty="0"/>
-              <a:t>-</a:t>
-            </a:r>
-            <a:r>
-              <a:rPr lang="en-US"/>
-              <a:t>cached filename</a:t>
+              <a:t>Git log command is used</a:t>
             </a:r>
             <a:endParaRPr lang="en-IN" dirty="0"/>
           </a:p>

</xml_diff>